<commit_message>
fix(master): rels path for images coming with  autoImportSlideMasters
</commit_message>
<xml_diff>
--- a/__tests__/pptx-templates/SlideMasters.pptx
+++ b/__tests__/pptx-templates/SlideMasters.pptx
@@ -3104,31 +3104,67 @@
           <a:chExt cx="0" cy="0"/>
         </a:xfrm>
       </p:grpSpPr>
-      <p:sp>
-        <p:nvSpPr>
-          <p:cNvPr id="2" name="Titelplatzhalter 1">
-            <a:extLst>
-              <a:ext uri="{FF2B5EF4-FFF2-40B4-BE49-F238E27FC236}">
-                <a16:creationId xmlns:a16="http://schemas.microsoft.com/office/drawing/2014/main" id="{9BB5D92C-6120-40B3-9E2A-8F47FF28F8FB}"/>
-              </a:ext>
-            </a:extLst>
-          </p:cNvPr>
-          <p:cNvSpPr>
-            <a:spLocks noGrp="1"/>
-          </p:cNvSpPr>
-          <p:nvPr>
-            <p:ph type="title"/>
-          </p:nvPr>
-        </p:nvSpPr>
+      <p:pic>
+        <p:nvPicPr>
+          <p:cNvPr id="9" name="Grafik 8">
+            <a:extLst>
+              <a:ext uri="{FF2B5EF4-FFF2-40B4-BE49-F238E27FC236}">
+                <a16:creationId xmlns:a16="http://schemas.microsoft.com/office/drawing/2014/main" id="{2AF28FC9-D9D9-4666-A5A1-E873655AD46E}"/>
+              </a:ext>
+            </a:extLst>
+          </p:cNvPr>
+          <p:cNvPicPr>
+            <a:picLocks noChangeAspect="1"/>
+          </p:cNvPicPr>
+          <p:nvPr userDrawn="1"/>
+        </p:nvPicPr>
+        <p:blipFill>
+          <a:blip r:embed="rId10">
+            <a:extLst>
+              <a:ext uri="{28A0092B-C50C-407E-A947-70E740481C1C}">
+                <a14:useLocalDpi xmlns:a14="http://schemas.microsoft.com/office/drawing/2010/main" val="0"/>
+              </a:ext>
+            </a:extLst>
+          </a:blip>
+          <a:stretch>
+            <a:fillRect/>
+          </a:stretch>
+        </p:blipFill>
         <p:spPr>
           <a:xfrm>
-            <a:off x="838200" y="365125"/>
-            <a:ext cx="10515600" cy="1325563"/>
+            <a:off x="0" y="0"/>
+            <a:ext cx="1645920" cy="6858000"/>
           </a:xfrm>
           <a:prstGeom prst="rect">
             <a:avLst/>
           </a:prstGeom>
         </p:spPr>
+      </p:pic>
+      <p:sp>
+        <p:nvSpPr>
+          <p:cNvPr id="2" name="Titelplatzhalter 1">
+            <a:extLst>
+              <a:ext uri="{FF2B5EF4-FFF2-40B4-BE49-F238E27FC236}">
+                <a16:creationId xmlns:a16="http://schemas.microsoft.com/office/drawing/2014/main" id="{9BB5D92C-6120-40B3-9E2A-8F47FF28F8FB}"/>
+              </a:ext>
+            </a:extLst>
+          </p:cNvPr>
+          <p:cNvSpPr>
+            <a:spLocks noGrp="1"/>
+          </p:cNvSpPr>
+          <p:nvPr>
+            <p:ph type="title"/>
+          </p:nvPr>
+        </p:nvSpPr>
+        <p:spPr>
+          <a:xfrm>
+            <a:off x="1873404" y="365125"/>
+            <a:ext cx="9480395" cy="1325563"/>
+          </a:xfrm>
+          <a:prstGeom prst="rect">
+            <a:avLst/>
+          </a:prstGeom>
+        </p:spPr>
         <p:txBody>
           <a:bodyPr vert="horz" lIns="91440" tIns="45720" rIns="91440" bIns="45720" rtlCol="0" anchor="ctr">
             <a:normAutofit/>
@@ -3160,8 +3196,8 @@
         </p:nvSpPr>
         <p:spPr>
           <a:xfrm>
-            <a:off x="838200" y="1825625"/>
-            <a:ext cx="10515600" cy="4351338"/>
+            <a:off x="1873404" y="1825625"/>
+            <a:ext cx="9480395" cy="4351338"/>
           </a:xfrm>
           <a:prstGeom prst="rect">
             <a:avLst/>
@@ -3342,61 +3378,6 @@
               <a:rPr lang="de-DE" smtClean="0"/>
               <a:t>‹Nr.›</a:t>
             </a:fld>
-            <a:endParaRPr lang="de-DE"/>
-          </a:p>
-        </p:txBody>
-      </p:sp>
-      <p:sp>
-        <p:nvSpPr>
-          <p:cNvPr id="7" name="Rechteck 6">
-            <a:extLst>
-              <a:ext uri="{FF2B5EF4-FFF2-40B4-BE49-F238E27FC236}">
-                <a16:creationId xmlns:a16="http://schemas.microsoft.com/office/drawing/2014/main" id="{FD534D31-B89A-461E-993D-12B890E73DF3}"/>
-              </a:ext>
-            </a:extLst>
-          </p:cNvPr>
-          <p:cNvSpPr/>
-          <p:nvPr userDrawn="1"/>
-        </p:nvSpPr>
-        <p:spPr>
-          <a:xfrm>
-            <a:off x="0" y="0"/>
-            <a:ext cx="579863" cy="6858000"/>
-          </a:xfrm>
-          <a:prstGeom prst="rect">
-            <a:avLst/>
-          </a:prstGeom>
-          <a:solidFill>
-            <a:schemeClr val="accent6">
-              <a:lumMod val="40000"/>
-              <a:lumOff val="60000"/>
-            </a:schemeClr>
-          </a:solidFill>
-          <a:ln>
-            <a:noFill/>
-          </a:ln>
-        </p:spPr>
-        <p:style>
-          <a:lnRef idx="2">
-            <a:schemeClr val="accent1">
-              <a:shade val="50000"/>
-            </a:schemeClr>
-          </a:lnRef>
-          <a:fillRef idx="1">
-            <a:schemeClr val="accent1"/>
-          </a:fillRef>
-          <a:effectRef idx="0">
-            <a:schemeClr val="accent1"/>
-          </a:effectRef>
-          <a:fontRef idx="minor">
-            <a:schemeClr val="lt1"/>
-          </a:fontRef>
-        </p:style>
-        <p:txBody>
-          <a:bodyPr rtlCol="0" anchor="ctr"/>
-          <a:lstStyle/>
-          <a:p>
-            <a:pPr algn="ctr"/>
             <a:endParaRPr lang="de-DE"/>
           </a:p>
         </p:txBody>

</xml_diff>

<commit_message>
fix(master): status; add comments / ToDos
</commit_message>
<xml_diff>
--- a/__tests__/pptx-templates/SlideMasters.pptx
+++ b/__tests__/pptx-templates/SlideMasters.pptx
@@ -3030,45 +3030,6 @@
           </a:p>
         </p:txBody>
       </p:sp>
-      <p:pic>
-        <p:nvPicPr>
-          <p:cNvPr id="8" name="Grafik 7" descr="Playbook">
-            <a:extLst>
-              <a:ext uri="{FF2B5EF4-FFF2-40B4-BE49-F238E27FC236}">
-                <a16:creationId xmlns:a16="http://schemas.microsoft.com/office/drawing/2014/main" id="{B15BB464-0E4E-4509-B492-622B9D7B2931}"/>
-              </a:ext>
-            </a:extLst>
-          </p:cNvPr>
-          <p:cNvPicPr>
-            <a:picLocks noChangeAspect="1"/>
-          </p:cNvPicPr>
-          <p:nvPr userDrawn="1"/>
-        </p:nvPicPr>
-        <p:blipFill>
-          <a:blip r:embed="rId2">
-            <a:extLst>
-              <a:ext uri="{28A0092B-C50C-407E-A947-70E740481C1C}">
-                <a14:useLocalDpi xmlns:a14="http://schemas.microsoft.com/office/drawing/2010/main" val="0"/>
-              </a:ext>
-              <a:ext uri="{96DAC541-7B7A-43D3-8B79-37D633B846F1}">
-                <asvg:svgBlip xmlns:asvg="http://schemas.microsoft.com/office/drawing/2016/SVG/main" r:embed="rId3"/>
-              </a:ext>
-            </a:extLst>
-          </a:blip>
-          <a:stretch>
-            <a:fillRect/>
-          </a:stretch>
-        </p:blipFill>
-        <p:spPr>
-          <a:xfrm>
-            <a:off x="96644" y="136525"/>
-            <a:ext cx="914400" cy="914400"/>
-          </a:xfrm>
-          <a:prstGeom prst="rect">
-            <a:avLst/>
-          </a:prstGeom>
-        </p:spPr>
-      </p:pic>
     </p:spTree>
     <p:extLst>
       <p:ext uri="{BB962C8B-B14F-4D97-AF65-F5344CB8AC3E}">
@@ -4052,6 +4013,42 @@
           </a:p>
         </p:txBody>
       </p:sp>
+      <p:pic>
+        <p:nvPicPr>
+          <p:cNvPr id="10" name="Grafik 9">
+            <a:extLst>
+              <a:ext uri="{FF2B5EF4-FFF2-40B4-BE49-F238E27FC236}">
+                <a16:creationId xmlns:a16="http://schemas.microsoft.com/office/drawing/2014/main" id="{83700086-C6C2-451C-9761-434E4135ED8E}"/>
+              </a:ext>
+            </a:extLst>
+          </p:cNvPr>
+          <p:cNvPicPr>
+            <a:picLocks noChangeAspect="1"/>
+          </p:cNvPicPr>
+          <p:nvPr userDrawn="1"/>
+        </p:nvPicPr>
+        <p:blipFill>
+          <a:blip r:embed="rId5">
+            <a:extLst>
+              <a:ext uri="{28A0092B-C50C-407E-A947-70E740481C1C}">
+                <a14:useLocalDpi xmlns:a14="http://schemas.microsoft.com/office/drawing/2010/main" val="0"/>
+              </a:ext>
+            </a:extLst>
+          </a:blip>
+          <a:stretch>
+            <a:fillRect/>
+          </a:stretch>
+        </p:blipFill>
+        <p:spPr>
+          <a:xfrm>
+            <a:off x="0" y="121264"/>
+            <a:ext cx="548688" cy="487722"/>
+          </a:xfrm>
+          <a:prstGeom prst="rect">
+            <a:avLst/>
+          </a:prstGeom>
+        </p:spPr>
+      </p:pic>
     </p:spTree>
     <p:extLst>
       <p:ext uri="{BB962C8B-B14F-4D97-AF65-F5344CB8AC3E}">
@@ -4493,7 +4490,7 @@
         </p:nvSpPr>
         <p:spPr>
           <a:xfrm>
-            <a:off x="247185" y="710096"/>
+            <a:off x="247185" y="1055069"/>
             <a:ext cx="591015" cy="635619"/>
           </a:xfrm>
           <a:prstGeom prst="smileyFace">

</xml_diff>

<commit_message>
feature(hasShapes): assert related content / add base class HasShapes;
</commit_message>
<xml_diff>
--- a/__tests__/pptx-templates/SlideMasters.pptx
+++ b/__tests__/pptx-templates/SlideMasters.pptx
@@ -3030,6 +3030,42 @@
           </a:p>
         </p:txBody>
       </p:sp>
+      <p:pic>
+        <p:nvPicPr>
+          <p:cNvPr id="7" name="Grafik 6">
+            <a:extLst>
+              <a:ext uri="{FF2B5EF4-FFF2-40B4-BE49-F238E27FC236}">
+                <a16:creationId xmlns:a16="http://schemas.microsoft.com/office/drawing/2014/main" id="{5E9FC675-9FBE-43CB-93AF-CDDB084DD2ED}"/>
+              </a:ext>
+            </a:extLst>
+          </p:cNvPr>
+          <p:cNvPicPr>
+            <a:picLocks noChangeAspect="1"/>
+          </p:cNvPicPr>
+          <p:nvPr userDrawn="1"/>
+        </p:nvPicPr>
+        <p:blipFill>
+          <a:blip r:embed="rId2">
+            <a:extLst>
+              <a:ext uri="{28A0092B-C50C-407E-A947-70E740481C1C}">
+                <a14:useLocalDpi xmlns:a14="http://schemas.microsoft.com/office/drawing/2010/main" val="0"/>
+              </a:ext>
+            </a:extLst>
+          </a:blip>
+          <a:stretch>
+            <a:fillRect/>
+          </a:stretch>
+        </p:blipFill>
+        <p:spPr>
+          <a:xfrm>
+            <a:off x="667103" y="107658"/>
+            <a:ext cx="612134" cy="393992"/>
+          </a:xfrm>
+          <a:prstGeom prst="rect">
+            <a:avLst/>
+          </a:prstGeom>
+        </p:spPr>
+      </p:pic>
     </p:spTree>
     <p:extLst>
       <p:ext uri="{BB962C8B-B14F-4D97-AF65-F5344CB8AC3E}">
@@ -4461,7 +4497,7 @@
             <a:spLocks noGrp="1"/>
           </p:cNvSpPr>
           <p:nvPr>
-            <p:ph type="title"/>
+            <p:ph type="ctrTitle"/>
           </p:nvPr>
         </p:nvSpPr>
         <p:spPr/>
@@ -4473,6 +4509,31 @@
               <a:rPr lang="de-DE"/>
               <a:t>Orange Title</a:t>
             </a:r>
+          </a:p>
+        </p:txBody>
+      </p:sp>
+      <p:sp>
+        <p:nvSpPr>
+          <p:cNvPr id="2" name="Untertitel 1">
+            <a:extLst>
+              <a:ext uri="{FF2B5EF4-FFF2-40B4-BE49-F238E27FC236}">
+                <a16:creationId xmlns:a16="http://schemas.microsoft.com/office/drawing/2014/main" id="{085AF15E-5123-4215-B94C-2ABE70D958F4}"/>
+              </a:ext>
+            </a:extLst>
+          </p:cNvPr>
+          <p:cNvSpPr>
+            <a:spLocks noGrp="1"/>
+          </p:cNvSpPr>
+          <p:nvPr>
+            <p:ph type="subTitle" idx="1"/>
+          </p:nvPr>
+        </p:nvSpPr>
+        <p:spPr/>
+        <p:txBody>
+          <a:bodyPr/>
+          <a:lstStyle/>
+          <a:p>
+            <a:endParaRPr lang="de-DE"/>
           </a:p>
         </p:txBody>
       </p:sp>

</xml_diff>